<commit_message>
Add) Service flow ppt
</commit_message>
<xml_diff>
--- a/Documents/Service flow.pptx
+++ b/Documents/Service flow.pptx
@@ -117,6 +117,9 @@
         </p14:section>
       </p14:sectionLst>
     </p:ext>
+    <p:ext uri="{EFAFB233-063F-42B5-8137-9DF3F51BA10A}">
+      <p15:sldGuideLst xmlns:p15="http://schemas.microsoft.com/office/powerpoint/2012/main"/>
+    </p:ext>
   </p:extLst>
 </p:presentation>
 </file>
@@ -252,7 +255,7 @@
           <a:p>
             <a:fld id="{A6650CEC-EED5-4ADF-9278-421313A9D7BF}" type="datetimeFigureOut">
               <a:rPr lang="ko-KR" altLang="en-US" smtClean="0"/>
-              <a:t>2018-08-09</a:t>
+              <a:t>2018-08-11</a:t>
             </a:fld>
             <a:endParaRPr lang="ko-KR" altLang="en-US"/>
           </a:p>
@@ -422,7 +425,7 @@
           <a:p>
             <a:fld id="{A6650CEC-EED5-4ADF-9278-421313A9D7BF}" type="datetimeFigureOut">
               <a:rPr lang="ko-KR" altLang="en-US" smtClean="0"/>
-              <a:t>2018-08-09</a:t>
+              <a:t>2018-08-11</a:t>
             </a:fld>
             <a:endParaRPr lang="ko-KR" altLang="en-US"/>
           </a:p>
@@ -602,7 +605,7 @@
           <a:p>
             <a:fld id="{A6650CEC-EED5-4ADF-9278-421313A9D7BF}" type="datetimeFigureOut">
               <a:rPr lang="ko-KR" altLang="en-US" smtClean="0"/>
-              <a:t>2018-08-09</a:t>
+              <a:t>2018-08-11</a:t>
             </a:fld>
             <a:endParaRPr lang="ko-KR" altLang="en-US"/>
           </a:p>
@@ -772,7 +775,7 @@
           <a:p>
             <a:fld id="{A6650CEC-EED5-4ADF-9278-421313A9D7BF}" type="datetimeFigureOut">
               <a:rPr lang="ko-KR" altLang="en-US" smtClean="0"/>
-              <a:t>2018-08-09</a:t>
+              <a:t>2018-08-11</a:t>
             </a:fld>
             <a:endParaRPr lang="ko-KR" altLang="en-US"/>
           </a:p>
@@ -1016,7 +1019,7 @@
           <a:p>
             <a:fld id="{A6650CEC-EED5-4ADF-9278-421313A9D7BF}" type="datetimeFigureOut">
               <a:rPr lang="ko-KR" altLang="en-US" smtClean="0"/>
-              <a:t>2018-08-09</a:t>
+              <a:t>2018-08-11</a:t>
             </a:fld>
             <a:endParaRPr lang="ko-KR" altLang="en-US"/>
           </a:p>
@@ -1248,7 +1251,7 @@
           <a:p>
             <a:fld id="{A6650CEC-EED5-4ADF-9278-421313A9D7BF}" type="datetimeFigureOut">
               <a:rPr lang="ko-KR" altLang="en-US" smtClean="0"/>
-              <a:t>2018-08-09</a:t>
+              <a:t>2018-08-11</a:t>
             </a:fld>
             <a:endParaRPr lang="ko-KR" altLang="en-US"/>
           </a:p>
@@ -1615,7 +1618,7 @@
           <a:p>
             <a:fld id="{A6650CEC-EED5-4ADF-9278-421313A9D7BF}" type="datetimeFigureOut">
               <a:rPr lang="ko-KR" altLang="en-US" smtClean="0"/>
-              <a:t>2018-08-09</a:t>
+              <a:t>2018-08-11</a:t>
             </a:fld>
             <a:endParaRPr lang="ko-KR" altLang="en-US"/>
           </a:p>
@@ -1733,7 +1736,7 @@
           <a:p>
             <a:fld id="{A6650CEC-EED5-4ADF-9278-421313A9D7BF}" type="datetimeFigureOut">
               <a:rPr lang="ko-KR" altLang="en-US" smtClean="0"/>
-              <a:t>2018-08-09</a:t>
+              <a:t>2018-08-11</a:t>
             </a:fld>
             <a:endParaRPr lang="ko-KR" altLang="en-US"/>
           </a:p>
@@ -1828,7 +1831,7 @@
           <a:p>
             <a:fld id="{A6650CEC-EED5-4ADF-9278-421313A9D7BF}" type="datetimeFigureOut">
               <a:rPr lang="ko-KR" altLang="en-US" smtClean="0"/>
-              <a:t>2018-08-09</a:t>
+              <a:t>2018-08-11</a:t>
             </a:fld>
             <a:endParaRPr lang="ko-KR" altLang="en-US"/>
           </a:p>
@@ -2105,7 +2108,7 @@
           <a:p>
             <a:fld id="{A6650CEC-EED5-4ADF-9278-421313A9D7BF}" type="datetimeFigureOut">
               <a:rPr lang="ko-KR" altLang="en-US" smtClean="0"/>
-              <a:t>2018-08-09</a:t>
+              <a:t>2018-08-11</a:t>
             </a:fld>
             <a:endParaRPr lang="ko-KR" altLang="en-US"/>
           </a:p>
@@ -2362,7 +2365,7 @@
           <a:p>
             <a:fld id="{A6650CEC-EED5-4ADF-9278-421313A9D7BF}" type="datetimeFigureOut">
               <a:rPr lang="ko-KR" altLang="en-US" smtClean="0"/>
-              <a:t>2018-08-09</a:t>
+              <a:t>2018-08-11</a:t>
             </a:fld>
             <a:endParaRPr lang="ko-KR" altLang="en-US"/>
           </a:p>
@@ -2575,7 +2578,7 @@
           <a:p>
             <a:fld id="{A6650CEC-EED5-4ADF-9278-421313A9D7BF}" type="datetimeFigureOut">
               <a:rPr lang="ko-KR" altLang="en-US" smtClean="0"/>
-              <a:t>2018-08-09</a:t>
+              <a:t>2018-08-11</a:t>
             </a:fld>
             <a:endParaRPr lang="ko-KR" altLang="en-US"/>
           </a:p>
@@ -3045,10 +3048,10 @@
           <a:lstStyle/>
           <a:p>
             <a:r>
-              <a:rPr lang="en-US" altLang="ko-KR" dirty="0"/>
+              <a:rPr lang="en-US" altLang="ko-KR" b="1" dirty="0"/>
               <a:t>Service Flow</a:t>
             </a:r>
-            <a:endParaRPr lang="ko-KR" altLang="en-US" dirty="0"/>
+            <a:endParaRPr lang="ko-KR" altLang="en-US" b="1" dirty="0"/>
           </a:p>
         </p:txBody>
       </p:sp>
@@ -3298,7 +3301,7 @@
           <a:p>
             <a:r>
               <a:rPr lang="ko-KR" altLang="en-US" sz="800" b="1"/>
-              <a:t>도감채우기</a:t>
+              <a:t>도감보기</a:t>
             </a:r>
             <a:endParaRPr lang="ko-KR" altLang="en-US" sz="900" b="1" dirty="0"/>
           </a:p>
@@ -3354,8 +3357,8 @@
         </p:nvSpPr>
         <p:spPr>
           <a:xfrm>
-            <a:off x="3694863" y="4966278"/>
-            <a:ext cx="688442" cy="215444"/>
+            <a:off x="3579391" y="4966278"/>
+            <a:ext cx="841086" cy="215444"/>
           </a:xfrm>
           <a:prstGeom prst="rect">
             <a:avLst/>
@@ -3369,8 +3372,8 @@
           <a:lstStyle/>
           <a:p>
             <a:r>
-              <a:rPr lang="ko-KR" altLang="en-US" sz="800" b="1" dirty="0" err="1"/>
-              <a:t>즐겨찾기</a:t>
+              <a:rPr lang="ko-KR" altLang="en-US" sz="800" b="1"/>
+              <a:t>즐겨찾기보기</a:t>
             </a:r>
             <a:endParaRPr lang="ko-KR" altLang="en-US" sz="900" b="1" dirty="0"/>
           </a:p>
@@ -3476,7 +3479,7 @@
         </p:blipFill>
         <p:spPr>
           <a:xfrm>
-            <a:off x="4835662" y="3304383"/>
+            <a:off x="4860472" y="3781714"/>
             <a:ext cx="557436" cy="557436"/>
           </a:xfrm>
           <a:prstGeom prst="rect">
@@ -3498,7 +3501,7 @@
         </p:nvSpPr>
         <p:spPr>
           <a:xfrm>
-            <a:off x="4772379" y="3088939"/>
+            <a:off x="4797189" y="3566270"/>
             <a:ext cx="815821" cy="215444"/>
           </a:xfrm>
           <a:prstGeom prst="rect">
@@ -3513,7 +3516,7 @@
           <a:lstStyle/>
           <a:p>
             <a:r>
-              <a:rPr lang="ko-KR" altLang="en-US" sz="800" b="1"/>
+              <a:rPr lang="ko-KR" altLang="en-US" sz="800" b="1" dirty="0"/>
               <a:t>명예의전당</a:t>
             </a:r>
             <a:endParaRPr lang="ko-KR" altLang="en-US" sz="900" b="1" dirty="0"/>
@@ -3981,9 +3984,9 @@
           <p:nvPr/>
         </p:nvCxnSpPr>
         <p:spPr>
-          <a:xfrm flipV="1">
-            <a:off x="4251108" y="3583101"/>
-            <a:ext cx="584554" cy="1576"/>
+          <a:xfrm>
+            <a:off x="4251108" y="3584677"/>
+            <a:ext cx="609364" cy="475755"/>
           </a:xfrm>
           <a:prstGeom prst="straightConnector1">
             <a:avLst/>
@@ -5171,6 +5174,593 @@
           <a:xfrm>
             <a:off x="5415715" y="5465761"/>
             <a:ext cx="736214" cy="0"/>
+          </a:xfrm>
+          <a:prstGeom prst="straightConnector1">
+            <a:avLst/>
+          </a:prstGeom>
+          <a:ln>
+            <a:tailEnd type="triangle"/>
+          </a:ln>
+        </p:spPr>
+        <p:style>
+          <a:lnRef idx="1">
+            <a:schemeClr val="dk1"/>
+          </a:lnRef>
+          <a:fillRef idx="0">
+            <a:schemeClr val="dk1"/>
+          </a:fillRef>
+          <a:effectRef idx="0">
+            <a:schemeClr val="dk1"/>
+          </a:effectRef>
+          <a:fontRef idx="minor">
+            <a:schemeClr val="tx1"/>
+          </a:fontRef>
+        </p:style>
+      </p:cxnSp>
+      <p:pic>
+        <p:nvPicPr>
+          <p:cNvPr id="71" name="그림 70">
+            <a:extLst>
+              <a:ext uri="{FF2B5EF4-FFF2-40B4-BE49-F238E27FC236}">
+                <a16:creationId xmlns:a16="http://schemas.microsoft.com/office/drawing/2014/main" id="{4FFD7E88-8B88-4DEF-88F7-E65E6C55739D}"/>
+              </a:ext>
+            </a:extLst>
+          </p:cNvPr>
+          <p:cNvPicPr>
+            <a:picLocks noChangeAspect="1"/>
+          </p:cNvPicPr>
+          <p:nvPr/>
+        </p:nvPicPr>
+        <p:blipFill>
+          <a:blip r:embed="rId2">
+            <a:extLst>
+              <a:ext uri="{28A0092B-C50C-407E-A947-70E740481C1C}">
+                <a14:useLocalDpi xmlns:a14="http://schemas.microsoft.com/office/drawing/2010/main" val="0"/>
+              </a:ext>
+            </a:extLst>
+          </a:blip>
+          <a:stretch>
+            <a:fillRect/>
+          </a:stretch>
+        </p:blipFill>
+        <p:spPr>
+          <a:xfrm>
+            <a:off x="4835662" y="2918840"/>
+            <a:ext cx="557436" cy="557436"/>
+          </a:xfrm>
+          <a:prstGeom prst="rect">
+            <a:avLst/>
+          </a:prstGeom>
+        </p:spPr>
+      </p:pic>
+      <p:sp>
+        <p:nvSpPr>
+          <p:cNvPr id="72" name="TextBox 71">
+            <a:extLst>
+              <a:ext uri="{FF2B5EF4-FFF2-40B4-BE49-F238E27FC236}">
+                <a16:creationId xmlns:a16="http://schemas.microsoft.com/office/drawing/2014/main" id="{22474595-807F-4F06-849C-C2660171BEF6}"/>
+              </a:ext>
+            </a:extLst>
+          </p:cNvPr>
+          <p:cNvSpPr txBox="1"/>
+          <p:nvPr/>
+        </p:nvSpPr>
+        <p:spPr>
+          <a:xfrm>
+            <a:off x="4835662" y="2697129"/>
+            <a:ext cx="815821" cy="215444"/>
+          </a:xfrm>
+          <a:prstGeom prst="rect">
+            <a:avLst/>
+          </a:prstGeom>
+          <a:noFill/>
+        </p:spPr>
+        <p:txBody>
+          <a:bodyPr wrap="square" rtlCol="0">
+            <a:spAutoFit/>
+          </a:bodyPr>
+          <a:lstStyle/>
+          <a:p>
+            <a:r>
+              <a:rPr lang="ko-KR" altLang="en-US" sz="800" b="1" dirty="0"/>
+              <a:t>후기쓰기</a:t>
+            </a:r>
+            <a:endParaRPr lang="ko-KR" altLang="en-US" sz="900" b="1" dirty="0"/>
+          </a:p>
+        </p:txBody>
+      </p:sp>
+      <p:cxnSp>
+        <p:nvCxnSpPr>
+          <p:cNvPr id="74" name="직선 화살표 연결선 73">
+            <a:extLst>
+              <a:ext uri="{FF2B5EF4-FFF2-40B4-BE49-F238E27FC236}">
+                <a16:creationId xmlns:a16="http://schemas.microsoft.com/office/drawing/2014/main" id="{AC84F8F2-6A1B-4D4C-8E21-F9012C8D8A34}"/>
+              </a:ext>
+            </a:extLst>
+          </p:cNvPr>
+          <p:cNvCxnSpPr>
+            <a:cxnSpLocks/>
+            <a:stCxn id="88" idx="3"/>
+            <a:endCxn id="71" idx="1"/>
+          </p:cNvCxnSpPr>
+          <p:nvPr/>
+        </p:nvCxnSpPr>
+        <p:spPr>
+          <a:xfrm flipV="1">
+            <a:off x="4251108" y="3197558"/>
+            <a:ext cx="584554" cy="387119"/>
+          </a:xfrm>
+          <a:prstGeom prst="straightConnector1">
+            <a:avLst/>
+          </a:prstGeom>
+          <a:ln>
+            <a:tailEnd type="triangle"/>
+          </a:ln>
+        </p:spPr>
+        <p:style>
+          <a:lnRef idx="1">
+            <a:schemeClr val="dk1"/>
+          </a:lnRef>
+          <a:fillRef idx="0">
+            <a:schemeClr val="dk1"/>
+          </a:fillRef>
+          <a:effectRef idx="0">
+            <a:schemeClr val="dk1"/>
+          </a:effectRef>
+          <a:fontRef idx="minor">
+            <a:schemeClr val="tx1"/>
+          </a:fontRef>
+        </p:style>
+      </p:cxnSp>
+      <p:pic>
+        <p:nvPicPr>
+          <p:cNvPr id="79" name="그림 78">
+            <a:extLst>
+              <a:ext uri="{FF2B5EF4-FFF2-40B4-BE49-F238E27FC236}">
+                <a16:creationId xmlns:a16="http://schemas.microsoft.com/office/drawing/2014/main" id="{41ED14E4-F373-4662-8EE2-1C66C38FC923}"/>
+              </a:ext>
+            </a:extLst>
+          </p:cNvPr>
+          <p:cNvPicPr>
+            <a:picLocks noChangeAspect="1"/>
+          </p:cNvPicPr>
+          <p:nvPr/>
+        </p:nvPicPr>
+        <p:blipFill>
+          <a:blip r:embed="rId2">
+            <a:extLst>
+              <a:ext uri="{28A0092B-C50C-407E-A947-70E740481C1C}">
+                <a14:useLocalDpi xmlns:a14="http://schemas.microsoft.com/office/drawing/2010/main" val="0"/>
+              </a:ext>
+            </a:extLst>
+          </a:blip>
+          <a:stretch>
+            <a:fillRect/>
+          </a:stretch>
+        </p:blipFill>
+        <p:spPr>
+          <a:xfrm>
+            <a:off x="7217474" y="523615"/>
+            <a:ext cx="557436" cy="557436"/>
+          </a:xfrm>
+          <a:prstGeom prst="rect">
+            <a:avLst/>
+          </a:prstGeom>
+        </p:spPr>
+      </p:pic>
+      <p:sp>
+        <p:nvSpPr>
+          <p:cNvPr id="80" name="TextBox 79">
+            <a:extLst>
+              <a:ext uri="{FF2B5EF4-FFF2-40B4-BE49-F238E27FC236}">
+                <a16:creationId xmlns:a16="http://schemas.microsoft.com/office/drawing/2014/main" id="{1A0D539E-3BBC-47E4-A3D0-69D6C8329156}"/>
+              </a:ext>
+            </a:extLst>
+          </p:cNvPr>
+          <p:cNvSpPr txBox="1"/>
+          <p:nvPr/>
+        </p:nvSpPr>
+        <p:spPr>
+          <a:xfrm>
+            <a:off x="6998312" y="310836"/>
+            <a:ext cx="1141338" cy="215444"/>
+          </a:xfrm>
+          <a:prstGeom prst="rect">
+            <a:avLst/>
+          </a:prstGeom>
+          <a:noFill/>
+        </p:spPr>
+        <p:txBody>
+          <a:bodyPr wrap="square" rtlCol="0">
+            <a:spAutoFit/>
+          </a:bodyPr>
+          <a:lstStyle/>
+          <a:p>
+            <a:r>
+              <a:rPr lang="ko-KR" altLang="en-US" sz="800" b="1" dirty="0"/>
+              <a:t>관광정보 </a:t>
+            </a:r>
+            <a:r>
+              <a:rPr lang="ko-KR" altLang="en-US" sz="800" b="1" dirty="0" err="1"/>
+              <a:t>즐겨찾기</a:t>
+            </a:r>
+            <a:endParaRPr lang="ko-KR" altLang="en-US" sz="900" b="1" dirty="0"/>
+          </a:p>
+        </p:txBody>
+      </p:sp>
+      <p:cxnSp>
+        <p:nvCxnSpPr>
+          <p:cNvPr id="86" name="직선 화살표 연결선 85">
+            <a:extLst>
+              <a:ext uri="{FF2B5EF4-FFF2-40B4-BE49-F238E27FC236}">
+                <a16:creationId xmlns:a16="http://schemas.microsoft.com/office/drawing/2014/main" id="{3942F1D7-43BB-467C-A98E-4A378EC3E0E3}"/>
+              </a:ext>
+            </a:extLst>
+          </p:cNvPr>
+          <p:cNvCxnSpPr>
+            <a:cxnSpLocks/>
+            <a:stCxn id="181" idx="3"/>
+            <a:endCxn id="79" idx="1"/>
+          </p:cNvCxnSpPr>
+          <p:nvPr/>
+        </p:nvCxnSpPr>
+        <p:spPr>
+          <a:xfrm>
+            <a:off x="6667732" y="799219"/>
+            <a:ext cx="549742" cy="3114"/>
+          </a:xfrm>
+          <a:prstGeom prst="straightConnector1">
+            <a:avLst/>
+          </a:prstGeom>
+          <a:ln>
+            <a:tailEnd type="triangle"/>
+          </a:ln>
+        </p:spPr>
+        <p:style>
+          <a:lnRef idx="1">
+            <a:schemeClr val="dk1"/>
+          </a:lnRef>
+          <a:fillRef idx="0">
+            <a:schemeClr val="dk1"/>
+          </a:fillRef>
+          <a:effectRef idx="0">
+            <a:schemeClr val="dk1"/>
+          </a:effectRef>
+          <a:fontRef idx="minor">
+            <a:schemeClr val="tx1"/>
+          </a:fontRef>
+        </p:style>
+      </p:cxnSp>
+      <p:pic>
+        <p:nvPicPr>
+          <p:cNvPr id="87" name="그림 86">
+            <a:extLst>
+              <a:ext uri="{FF2B5EF4-FFF2-40B4-BE49-F238E27FC236}">
+                <a16:creationId xmlns:a16="http://schemas.microsoft.com/office/drawing/2014/main" id="{DF714ACC-6516-4AA8-8D2C-4D826B1F55AC}"/>
+              </a:ext>
+            </a:extLst>
+          </p:cNvPr>
+          <p:cNvPicPr>
+            <a:picLocks noChangeAspect="1"/>
+          </p:cNvPicPr>
+          <p:nvPr/>
+        </p:nvPicPr>
+        <p:blipFill>
+          <a:blip r:embed="rId2">
+            <a:extLst>
+              <a:ext uri="{28A0092B-C50C-407E-A947-70E740481C1C}">
+                <a14:useLocalDpi xmlns:a14="http://schemas.microsoft.com/office/drawing/2010/main" val="0"/>
+              </a:ext>
+            </a:extLst>
+          </a:blip>
+          <a:stretch>
+            <a:fillRect/>
+          </a:stretch>
+        </p:blipFill>
+        <p:spPr>
+          <a:xfrm>
+            <a:off x="2888289" y="6196612"/>
+            <a:ext cx="557436" cy="557436"/>
+          </a:xfrm>
+          <a:prstGeom prst="rect">
+            <a:avLst/>
+          </a:prstGeom>
+        </p:spPr>
+      </p:pic>
+      <p:sp>
+        <p:nvSpPr>
+          <p:cNvPr id="100" name="TextBox 99">
+            <a:extLst>
+              <a:ext uri="{FF2B5EF4-FFF2-40B4-BE49-F238E27FC236}">
+                <a16:creationId xmlns:a16="http://schemas.microsoft.com/office/drawing/2014/main" id="{4F4DF0B1-2E3B-4A8F-BD1A-3C2205B9C0B3}"/>
+              </a:ext>
+            </a:extLst>
+          </p:cNvPr>
+          <p:cNvSpPr txBox="1"/>
+          <p:nvPr/>
+        </p:nvSpPr>
+        <p:spPr>
+          <a:xfrm>
+            <a:off x="2892386" y="5987789"/>
+            <a:ext cx="1204694" cy="215444"/>
+          </a:xfrm>
+          <a:prstGeom prst="rect">
+            <a:avLst/>
+          </a:prstGeom>
+          <a:noFill/>
+        </p:spPr>
+        <p:txBody>
+          <a:bodyPr wrap="square" rtlCol="0">
+            <a:spAutoFit/>
+          </a:bodyPr>
+          <a:lstStyle/>
+          <a:p>
+            <a:r>
+              <a:rPr lang="ko-KR" altLang="en-US" sz="800" b="1" dirty="0"/>
+              <a:t>날씨보기</a:t>
+            </a:r>
+            <a:endParaRPr lang="ko-KR" altLang="en-US" sz="900" b="1" dirty="0"/>
+          </a:p>
+        </p:txBody>
+      </p:sp>
+      <p:cxnSp>
+        <p:nvCxnSpPr>
+          <p:cNvPr id="103" name="직선 화살표 연결선 102">
+            <a:extLst>
+              <a:ext uri="{FF2B5EF4-FFF2-40B4-BE49-F238E27FC236}">
+                <a16:creationId xmlns:a16="http://schemas.microsoft.com/office/drawing/2014/main" id="{FBF26CC9-AEDB-411D-A9FE-3554130F684E}"/>
+              </a:ext>
+            </a:extLst>
+          </p:cNvPr>
+          <p:cNvCxnSpPr>
+            <a:cxnSpLocks/>
+            <a:stCxn id="96" idx="3"/>
+            <a:endCxn id="87" idx="1"/>
+          </p:cNvCxnSpPr>
+          <p:nvPr/>
+        </p:nvCxnSpPr>
+        <p:spPr>
+          <a:xfrm>
+            <a:off x="2494395" y="3584677"/>
+            <a:ext cx="393894" cy="2890653"/>
+          </a:xfrm>
+          <a:prstGeom prst="straightConnector1">
+            <a:avLst/>
+          </a:prstGeom>
+          <a:ln>
+            <a:tailEnd type="triangle"/>
+          </a:ln>
+        </p:spPr>
+        <p:style>
+          <a:lnRef idx="1">
+            <a:schemeClr val="dk1"/>
+          </a:lnRef>
+          <a:fillRef idx="0">
+            <a:schemeClr val="dk1"/>
+          </a:fillRef>
+          <a:effectRef idx="0">
+            <a:schemeClr val="dk1"/>
+          </a:effectRef>
+          <a:fontRef idx="minor">
+            <a:schemeClr val="tx1"/>
+          </a:fontRef>
+        </p:style>
+      </p:cxnSp>
+      <p:pic>
+        <p:nvPicPr>
+          <p:cNvPr id="104" name="그림 103">
+            <a:extLst>
+              <a:ext uri="{FF2B5EF4-FFF2-40B4-BE49-F238E27FC236}">
+                <a16:creationId xmlns:a16="http://schemas.microsoft.com/office/drawing/2014/main" id="{BE518BC3-791A-4F0A-B457-0EE6041163D1}"/>
+              </a:ext>
+            </a:extLst>
+          </p:cNvPr>
+          <p:cNvPicPr>
+            <a:picLocks noChangeAspect="1"/>
+          </p:cNvPicPr>
+          <p:nvPr/>
+        </p:nvPicPr>
+        <p:blipFill>
+          <a:blip r:embed="rId2">
+            <a:extLst>
+              <a:ext uri="{28A0092B-C50C-407E-A947-70E740481C1C}">
+                <a14:useLocalDpi xmlns:a14="http://schemas.microsoft.com/office/drawing/2010/main" val="0"/>
+              </a:ext>
+            </a:extLst>
+          </a:blip>
+          <a:stretch>
+            <a:fillRect/>
+          </a:stretch>
+        </p:blipFill>
+        <p:spPr>
+          <a:xfrm>
+            <a:off x="7217474" y="1435956"/>
+            <a:ext cx="557436" cy="557436"/>
+          </a:xfrm>
+          <a:prstGeom prst="rect">
+            <a:avLst/>
+          </a:prstGeom>
+        </p:spPr>
+      </p:pic>
+      <p:sp>
+        <p:nvSpPr>
+          <p:cNvPr id="106" name="TextBox 105">
+            <a:extLst>
+              <a:ext uri="{FF2B5EF4-FFF2-40B4-BE49-F238E27FC236}">
+                <a16:creationId xmlns:a16="http://schemas.microsoft.com/office/drawing/2014/main" id="{C8F73EAF-5981-4E2F-BB94-802C2BB99784}"/>
+              </a:ext>
+            </a:extLst>
+          </p:cNvPr>
+          <p:cNvSpPr txBox="1"/>
+          <p:nvPr/>
+        </p:nvSpPr>
+        <p:spPr>
+          <a:xfrm>
+            <a:off x="6998312" y="1223177"/>
+            <a:ext cx="1141338" cy="215444"/>
+          </a:xfrm>
+          <a:prstGeom prst="rect">
+            <a:avLst/>
+          </a:prstGeom>
+          <a:noFill/>
+        </p:spPr>
+        <p:txBody>
+          <a:bodyPr wrap="square" rtlCol="0">
+            <a:spAutoFit/>
+          </a:bodyPr>
+          <a:lstStyle/>
+          <a:p>
+            <a:r>
+              <a:rPr lang="ko-KR" altLang="en-US" sz="800" b="1" dirty="0"/>
+              <a:t>행사정보 </a:t>
+            </a:r>
+            <a:r>
+              <a:rPr lang="ko-KR" altLang="en-US" sz="800" b="1" dirty="0" err="1"/>
+              <a:t>즐겨찾기</a:t>
+            </a:r>
+            <a:endParaRPr lang="ko-KR" altLang="en-US" sz="900" b="1" dirty="0"/>
+          </a:p>
+        </p:txBody>
+      </p:sp>
+      <p:pic>
+        <p:nvPicPr>
+          <p:cNvPr id="107" name="그림 106">
+            <a:extLst>
+              <a:ext uri="{FF2B5EF4-FFF2-40B4-BE49-F238E27FC236}">
+                <a16:creationId xmlns:a16="http://schemas.microsoft.com/office/drawing/2014/main" id="{5E5C6E86-B4CB-4F30-A445-BC77727B4701}"/>
+              </a:ext>
+            </a:extLst>
+          </p:cNvPr>
+          <p:cNvPicPr>
+            <a:picLocks noChangeAspect="1"/>
+          </p:cNvPicPr>
+          <p:nvPr/>
+        </p:nvPicPr>
+        <p:blipFill>
+          <a:blip r:embed="rId2">
+            <a:extLst>
+              <a:ext uri="{28A0092B-C50C-407E-A947-70E740481C1C}">
+                <a14:useLocalDpi xmlns:a14="http://schemas.microsoft.com/office/drawing/2010/main" val="0"/>
+              </a:ext>
+            </a:extLst>
+          </a:blip>
+          <a:stretch>
+            <a:fillRect/>
+          </a:stretch>
+        </p:blipFill>
+        <p:spPr>
+          <a:xfrm>
+            <a:off x="7217474" y="2386201"/>
+            <a:ext cx="557436" cy="557436"/>
+          </a:xfrm>
+          <a:prstGeom prst="rect">
+            <a:avLst/>
+          </a:prstGeom>
+        </p:spPr>
+      </p:pic>
+      <p:sp>
+        <p:nvSpPr>
+          <p:cNvPr id="109" name="TextBox 108">
+            <a:extLst>
+              <a:ext uri="{FF2B5EF4-FFF2-40B4-BE49-F238E27FC236}">
+                <a16:creationId xmlns:a16="http://schemas.microsoft.com/office/drawing/2014/main" id="{196EAE9B-280B-4AF6-8085-F46396035D9F}"/>
+              </a:ext>
+            </a:extLst>
+          </p:cNvPr>
+          <p:cNvSpPr txBox="1"/>
+          <p:nvPr/>
+        </p:nvSpPr>
+        <p:spPr>
+          <a:xfrm>
+            <a:off x="6998312" y="2173422"/>
+            <a:ext cx="1141338" cy="215444"/>
+          </a:xfrm>
+          <a:prstGeom prst="rect">
+            <a:avLst/>
+          </a:prstGeom>
+          <a:noFill/>
+        </p:spPr>
+        <p:txBody>
+          <a:bodyPr wrap="square" rtlCol="0">
+            <a:spAutoFit/>
+          </a:bodyPr>
+          <a:lstStyle/>
+          <a:p>
+            <a:r>
+              <a:rPr lang="ko-KR" altLang="en-US" sz="800" b="1" dirty="0"/>
+              <a:t>숙박정보 </a:t>
+            </a:r>
+            <a:r>
+              <a:rPr lang="ko-KR" altLang="en-US" sz="800" b="1" dirty="0" err="1"/>
+              <a:t>즐겨찾기</a:t>
+            </a:r>
+            <a:endParaRPr lang="ko-KR" altLang="en-US" sz="900" b="1" dirty="0"/>
+          </a:p>
+        </p:txBody>
+      </p:sp>
+      <p:cxnSp>
+        <p:nvCxnSpPr>
+          <p:cNvPr id="110" name="직선 화살표 연결선 109">
+            <a:extLst>
+              <a:ext uri="{FF2B5EF4-FFF2-40B4-BE49-F238E27FC236}">
+                <a16:creationId xmlns:a16="http://schemas.microsoft.com/office/drawing/2014/main" id="{FE58499B-3B03-4429-9F7C-FAC6221EA780}"/>
+              </a:ext>
+            </a:extLst>
+          </p:cNvPr>
+          <p:cNvCxnSpPr>
+            <a:cxnSpLocks/>
+            <a:stCxn id="183" idx="3"/>
+            <a:endCxn id="104" idx="1"/>
+          </p:cNvCxnSpPr>
+          <p:nvPr/>
+        </p:nvCxnSpPr>
+        <p:spPr>
+          <a:xfrm flipV="1">
+            <a:off x="6667732" y="1714674"/>
+            <a:ext cx="549742" cy="130"/>
+          </a:xfrm>
+          <a:prstGeom prst="straightConnector1">
+            <a:avLst/>
+          </a:prstGeom>
+          <a:ln>
+            <a:tailEnd type="triangle"/>
+          </a:ln>
+        </p:spPr>
+        <p:style>
+          <a:lnRef idx="1">
+            <a:schemeClr val="dk1"/>
+          </a:lnRef>
+          <a:fillRef idx="0">
+            <a:schemeClr val="dk1"/>
+          </a:fillRef>
+          <a:effectRef idx="0">
+            <a:schemeClr val="dk1"/>
+          </a:effectRef>
+          <a:fontRef idx="minor">
+            <a:schemeClr val="tx1"/>
+          </a:fontRef>
+        </p:style>
+      </p:cxnSp>
+      <p:cxnSp>
+        <p:nvCxnSpPr>
+          <p:cNvPr id="112" name="직선 화살표 연결선 111">
+            <a:extLst>
+              <a:ext uri="{FF2B5EF4-FFF2-40B4-BE49-F238E27FC236}">
+                <a16:creationId xmlns:a16="http://schemas.microsoft.com/office/drawing/2014/main" id="{B0F1BF11-01F1-49EB-9FF8-59D8B5C40309}"/>
+              </a:ext>
+            </a:extLst>
+          </p:cNvPr>
+          <p:cNvCxnSpPr>
+            <a:cxnSpLocks/>
+            <a:stCxn id="185" idx="3"/>
+            <a:endCxn id="107" idx="1"/>
+          </p:cNvCxnSpPr>
+          <p:nvPr/>
+        </p:nvCxnSpPr>
+        <p:spPr>
+          <a:xfrm>
+            <a:off x="6667732" y="2659260"/>
+            <a:ext cx="549742" cy="5659"/>
           </a:xfrm>
           <a:prstGeom prst="straightConnector1">
             <a:avLst/>

</xml_diff>